<commit_message>
Changed movie reviews and ppt
Matched the movie reviews to output and updated the ppt
</commit_message>
<xml_diff>
--- a/Overview.pptx
+++ b/Overview.pptx
@@ -240,7 +240,7 @@
           <a:p>
             <a:fld id="{CDA3C146-E2BA-41EA-8AE9-0C67692768F2}" type="datetimeFigureOut">
               <a:rPr lang="en-US" smtClean="0"/>
-              <a:t>4/18/2021</a:t>
+              <a:t>4/19/2021</a:t>
             </a:fld>
             <a:endParaRPr lang="en-US" dirty="0"/>
           </a:p>
@@ -417,7 +417,7 @@
           <a:p>
             <a:fld id="{1F7D3EB6-8099-4744-9273-C8C1DD61A2EA}" type="datetimeFigureOut">
               <a:rPr lang="en-US" noProof="0" smtClean="0"/>
-              <a:t>4/18/2021</a:t>
+              <a:t>4/19/2021</a:t>
             </a:fld>
             <a:endParaRPr lang="en-US" noProof="0" dirty="0"/>
           </a:p>
@@ -44746,6 +44746,28 @@
               </a:solidFill>
             </a:endParaRPr>
           </a:p>
+          <a:p>
+            <a:r>
+              <a:rPr lang="en-IN" b="1" dirty="0">
+                <a:solidFill>
+                  <a:schemeClr val="tx1"/>
+                </a:solidFill>
+                <a:hlinkClick r:id="rId6">
+                  <a:extLst>
+                    <a:ext uri="{A12FA001-AC4F-418D-AE19-62706E023703}">
+                      <ahyp:hlinkClr xmlns:ahyp="http://schemas.microsoft.com/office/drawing/2018/hyperlinkcolor" val="tx"/>
+                    </a:ext>
+                  </a:extLst>
+                </a:hlinkClick>
+              </a:rPr>
+              <a:t>SpeechRecognition · PyPI</a:t>
+            </a:r>
+            <a:endParaRPr lang="en-IN" b="1" dirty="0">
+              <a:solidFill>
+                <a:schemeClr val="tx1"/>
+              </a:solidFill>
+            </a:endParaRPr>
+          </a:p>
         </p:txBody>
       </p:sp>
       <p:pic>
@@ -44765,7 +44787,7 @@
           </p:nvPr>
         </p:nvPicPr>
         <p:blipFill>
-          <a:blip r:embed="rId6">
+          <a:blip r:embed="rId7">
             <a:extLst>
               <a:ext uri="{28A0092B-C50C-407E-A947-70E740481C1C}">
                 <a14:useLocalDpi xmlns:a14="http://schemas.microsoft.com/office/drawing/2010/main" val="0"/>
@@ -46915,15 +46937,6 @@
 </file>
 
 <file path=customXml/item2.xml><?xml version="1.0" encoding="utf-8"?>
-<?mso-contentType ?>
-<FormTemplates xmlns="http://schemas.microsoft.com/sharepoint/v3/contenttype/forms">
-  <Display>DocumentLibraryForm</Display>
-  <Edit>DocumentLibraryForm</Edit>
-  <New>DocumentLibraryForm</New>
-</FormTemplates>
-</file>
-
-<file path=customXml/item3.xml><?xml version="1.0" encoding="utf-8"?>
 <ct:contentTypeSchema xmlns:ct="http://schemas.microsoft.com/office/2006/metadata/contentType" xmlns:ma="http://schemas.microsoft.com/office/2006/metadata/properties/metaAttributes" ct:_="" ma:_="" ma:contentTypeName="Document" ma:contentTypeID="0x01010079F111ED35F8CC479449609E8A0923A6" ma:contentTypeVersion="11" ma:contentTypeDescription="Create a new document." ma:contentTypeScope="" ma:versionID="96291512c1ee715ab617f4c07df79fc1">
   <xsd:schema xmlns:xsd="http://www.w3.org/2001/XMLSchema" xmlns:xs="http://www.w3.org/2001/XMLSchema" xmlns:p="http://schemas.microsoft.com/office/2006/metadata/properties" xmlns:ns2="71af3243-3dd4-4a8d-8c0d-dd76da1f02a5" xmlns:ns3="16c05727-aa75-4e4a-9b5f-8a80a1165891" targetNamespace="http://schemas.microsoft.com/office/2006/metadata/properties" ma:root="true" ma:fieldsID="8256c27c40ca5c40ce1cf6c44f0205df" ns2:_="" ns3:_="">
     <xsd:import namespace="71af3243-3dd4-4a8d-8c0d-dd76da1f02a5"/>
@@ -47134,6 +47147,15 @@
 </ct:contentTypeSchema>
 </file>
 
+<file path=customXml/item3.xml><?xml version="1.0" encoding="utf-8"?>
+<?mso-contentType ?>
+<FormTemplates xmlns="http://schemas.microsoft.com/sharepoint/v3/contenttype/forms">
+  <Display>DocumentLibraryForm</Display>
+  <Edit>DocumentLibraryForm</Edit>
+  <New>DocumentLibraryForm</New>
+</FormTemplates>
+</file>
+
 <file path=customXml/itemProps1.xml><?xml version="1.0" encoding="utf-8"?>
 <ds:datastoreItem xmlns:ds="http://schemas.openxmlformats.org/officeDocument/2006/customXml" ds:itemID="{D726A944-A9F4-4295-9B5E-C397EB1318B9}">
   <ds:schemaRefs>
@@ -47145,14 +47167,6 @@
 </file>
 
 <file path=customXml/itemProps2.xml><?xml version="1.0" encoding="utf-8"?>
-<ds:datastoreItem xmlns:ds="http://schemas.openxmlformats.org/officeDocument/2006/customXml" ds:itemID="{01743C61-8CA7-48FF-B2A3-6055DA854CF6}">
-  <ds:schemaRefs>
-    <ds:schemaRef ds:uri="http://schemas.microsoft.com/sharepoint/v3/contenttype/forms"/>
-  </ds:schemaRefs>
-</ds:datastoreItem>
-</file>
-
-<file path=customXml/itemProps3.xml><?xml version="1.0" encoding="utf-8"?>
 <ds:datastoreItem xmlns:ds="http://schemas.openxmlformats.org/officeDocument/2006/customXml" ds:itemID="{472965D8-9C19-4E48-8421-5D6B21FC440C}">
   <ds:schemaRefs>
     <ds:schemaRef ds:uri="http://schemas.microsoft.com/office/2006/metadata/contentType"/>
@@ -47169,4 +47183,12 @@
     <ds:schemaRef ds:uri="http://schemas.microsoft.com/internal/obd"/>
   </ds:schemaRefs>
 </ds:datastoreItem>
+</file>
+
+<file path=customXml/itemProps3.xml><?xml version="1.0" encoding="utf-8"?>
+<ds:datastoreItem xmlns:ds="http://schemas.openxmlformats.org/officeDocument/2006/customXml" ds:itemID="{01743C61-8CA7-48FF-B2A3-6055DA854CF6}">
+  <ds:schemaRefs>
+    <ds:schemaRef ds:uri="http://schemas.microsoft.com/sharepoint/v3/contenttype/forms"/>
+  </ds:schemaRefs>
+</ds:datastoreItem>
 </file>
</xml_diff>